<commit_message>
Add week 7 lecture
</commit_message>
<xml_diff>
--- a/Week 7/07 - Conditional Processing.pptx
+++ b/Week 7/07 - Conditional Processing.pptx
@@ -5,18 +5,30 @@
     <p:sldMasterId id="2147483648" r:id="rId1"/>
   </p:sldMasterIdLst>
   <p:notesMasterIdLst>
-    <p:notesMasterId r:id="rId3"/>
+    <p:notesMasterId r:id="rId15"/>
   </p:notesMasterIdLst>
   <p:handoutMasterIdLst>
-    <p:handoutMasterId r:id="rId4"/>
+    <p:handoutMasterId r:id="rId16"/>
   </p:handoutMasterIdLst>
   <p:sldIdLst>
     <p:sldId id="265" r:id="rId2"/>
+    <p:sldId id="267" r:id="rId3"/>
+    <p:sldId id="266" r:id="rId4"/>
+    <p:sldId id="268" r:id="rId5"/>
+    <p:sldId id="269" r:id="rId6"/>
+    <p:sldId id="270" r:id="rId7"/>
+    <p:sldId id="271" r:id="rId8"/>
+    <p:sldId id="272" r:id="rId9"/>
+    <p:sldId id="273" r:id="rId10"/>
+    <p:sldId id="274" r:id="rId11"/>
+    <p:sldId id="275" r:id="rId12"/>
+    <p:sldId id="276" r:id="rId13"/>
+    <p:sldId id="277" r:id="rId14"/>
   </p:sldIdLst>
   <p:sldSz cx="12188825" cy="6858000"/>
   <p:notesSz cx="6858000" cy="9144000"/>
   <p:custDataLst>
-    <p:tags r:id="rId5"/>
+    <p:tags r:id="rId17"/>
   </p:custDataLst>
   <p:defaultTextStyle>
     <a:defPPr>
@@ -221,7 +233,7 @@
           <a:p>
             <a:fld id="{59088EAF-6ECA-4616-85EF-35AA19C641F3}" type="datetimeFigureOut">
               <a:rPr lang="en-US"/>
-              <a:t>3/22/2018</a:t>
+              <a:t>3/25/2018</a:t>
             </a:fld>
             <a:endParaRPr/>
           </a:p>
@@ -386,7 +398,7 @@
           <a:p>
             <a:fld id="{3ABD2D7A-D230-4F91-BD59-0A39C2703BA8}" type="datetimeFigureOut">
               <a:rPr lang="en-US"/>
-              <a:t>3/22/2018</a:t>
+              <a:t>3/25/2018</a:t>
             </a:fld>
             <a:endParaRPr/>
           </a:p>
@@ -995,7 +1007,7 @@
           <a:p>
             <a:fld id="{03F41C87-7AD9-4845-A077-840E4A0F3F06}" type="datetimeFigureOut">
               <a:rPr lang="en-US"/>
-              <a:t>3/22/2018</a:t>
+              <a:t>3/25/2018</a:t>
             </a:fld>
             <a:endParaRPr/>
           </a:p>
@@ -1187,7 +1199,7 @@
           <a:p>
             <a:fld id="{03F41C87-7AD9-4845-A077-840E4A0F3F06}" type="datetimeFigureOut">
               <a:rPr lang="en-US"/>
-              <a:t>3/22/2018</a:t>
+              <a:t>3/25/2018</a:t>
             </a:fld>
             <a:endParaRPr/>
           </a:p>
@@ -1376,7 +1388,7 @@
           <a:p>
             <a:fld id="{03F41C87-7AD9-4845-A077-840E4A0F3F06}" type="datetimeFigureOut">
               <a:rPr lang="en-US"/>
-              <a:t>3/22/2018</a:t>
+              <a:t>3/25/2018</a:t>
             </a:fld>
             <a:endParaRPr/>
           </a:p>
@@ -1656,7 +1668,7 @@
           <a:p>
             <a:fld id="{03F41C87-7AD9-4845-A077-840E4A0F3F06}" type="datetimeFigureOut">
               <a:rPr lang="en-US"/>
-              <a:t>3/22/2018</a:t>
+              <a:t>3/25/2018</a:t>
             </a:fld>
             <a:endParaRPr/>
           </a:p>
@@ -1960,7 +1972,7 @@
           <a:p>
             <a:fld id="{03F41C87-7AD9-4845-A077-840E4A0F3F06}" type="datetimeFigureOut">
               <a:rPr lang="en-US"/>
-              <a:t>3/22/2018</a:t>
+              <a:t>3/25/2018</a:t>
             </a:fld>
             <a:endParaRPr/>
           </a:p>
@@ -2416,7 +2428,7 @@
           <a:p>
             <a:fld id="{03F41C87-7AD9-4845-A077-840E4A0F3F06}" type="datetimeFigureOut">
               <a:rPr lang="en-US"/>
-              <a:t>3/22/2018</a:t>
+              <a:t>3/25/2018</a:t>
             </a:fld>
             <a:endParaRPr/>
           </a:p>
@@ -2546,7 +2558,7 @@
           <a:p>
             <a:fld id="{03F41C87-7AD9-4845-A077-840E4A0F3F06}" type="datetimeFigureOut">
               <a:rPr lang="en-US"/>
-              <a:t>3/22/2018</a:t>
+              <a:t>3/25/2018</a:t>
             </a:fld>
             <a:endParaRPr/>
           </a:p>
@@ -2661,7 +2673,7 @@
           <a:p>
             <a:fld id="{03F41C87-7AD9-4845-A077-840E4A0F3F06}" type="datetimeFigureOut">
               <a:rPr lang="en-US"/>
-              <a:t>3/22/2018</a:t>
+              <a:t>3/25/2018</a:t>
             </a:fld>
             <a:endParaRPr/>
           </a:p>
@@ -2983,7 +2995,7 @@
           <a:p>
             <a:fld id="{03F41C87-7AD9-4845-A077-840E4A0F3F06}" type="datetimeFigureOut">
               <a:rPr lang="en-US"/>
-              <a:t>3/22/2018</a:t>
+              <a:t>3/25/2018</a:t>
             </a:fld>
             <a:endParaRPr/>
           </a:p>
@@ -3295,7 +3307,7 @@
             <a:fld id="{03F41C87-7AD9-4845-A077-840E4A0F3F06}" type="datetimeFigureOut">
               <a:rPr lang="en-US"/>
               <a:pPr/>
-              <a:t>3/22/2018</a:t>
+              <a:t>3/25/2018</a:t>
             </a:fld>
             <a:endParaRPr/>
           </a:p>
@@ -3549,7 +3561,7 @@
             <a:fld id="{03F41C87-7AD9-4845-A077-840E4A0F3F06}" type="datetimeFigureOut">
               <a:rPr lang="en-US" smtClean="0"/>
               <a:pPr/>
-              <a:t>3/22/2018</a:t>
+              <a:t>3/25/2018</a:t>
             </a:fld>
             <a:endParaRPr lang="en-US"/>
           </a:p>
@@ -4014,6 +4026,2285 @@
     <p:extLst>
       <p:ext uri="{BB962C8B-B14F-4D97-AF65-F5344CB8AC3E}">
         <p14:creationId xmlns:p14="http://schemas.microsoft.com/office/powerpoint/2010/main" val="2808920126"/>
+      </p:ext>
+    </p:extLst>
+  </p:cSld>
+  <p:clrMapOvr>
+    <a:masterClrMapping/>
+  </p:clrMapOvr>
+  <mc:AlternateContent xmlns:mc="http://schemas.openxmlformats.org/markup-compatibility/2006" xmlns:p14="http://schemas.microsoft.com/office/powerpoint/2010/main">
+    <mc:Choice Requires="p14">
+      <p:transition spd="med" p14:dur="700">
+        <p:fade/>
+      </p:transition>
+    </mc:Choice>
+    <mc:Fallback xmlns="">
+      <p:transition spd="med">
+        <p:fade/>
+      </p:transition>
+    </mc:Fallback>
+  </mc:AlternateContent>
+</p:sld>
+</file>
+
+<file path=ppt/slides/slide10.xml><?xml version="1.0" encoding="utf-8"?>
+<p:sld xmlns:a="http://schemas.openxmlformats.org/drawingml/2006/main" xmlns:r="http://schemas.openxmlformats.org/officeDocument/2006/relationships" xmlns:p="http://schemas.openxmlformats.org/presentationml/2006/main">
+  <p:cSld>
+    <p:spTree>
+      <p:nvGrpSpPr>
+        <p:cNvPr id="1" name=""/>
+        <p:cNvGrpSpPr/>
+        <p:nvPr/>
+      </p:nvGrpSpPr>
+      <p:grpSpPr>
+        <a:xfrm>
+          <a:off x="0" y="0"/>
+          <a:ext cx="0" cy="0"/>
+          <a:chOff x="0" y="0"/>
+          <a:chExt cx="0" cy="0"/>
+        </a:xfrm>
+      </p:grpSpPr>
+      <p:sp>
+        <p:nvSpPr>
+          <p:cNvPr id="2" name="Title 1"/>
+          <p:cNvSpPr>
+            <a:spLocks noGrp="1"/>
+          </p:cNvSpPr>
+          <p:nvPr>
+            <p:ph type="title"/>
+          </p:nvPr>
+        </p:nvSpPr>
+        <p:spPr/>
+        <p:txBody>
+          <a:bodyPr/>
+          <a:lstStyle/>
+          <a:p>
+            <a:r>
+              <a:rPr lang="en-US" dirty="0" smtClean="0"/>
+              <a:t>Example 1</a:t>
+            </a:r>
+            <a:endParaRPr lang="en-US" dirty="0"/>
+          </a:p>
+        </p:txBody>
+      </p:sp>
+      <p:sp>
+        <p:nvSpPr>
+          <p:cNvPr id="4" name="TextBox 3"/>
+          <p:cNvSpPr txBox="1"/>
+          <p:nvPr/>
+        </p:nvSpPr>
+        <p:spPr>
+          <a:xfrm>
+            <a:off x="1674812" y="1905000"/>
+            <a:ext cx="7848600" cy="1754326"/>
+          </a:xfrm>
+          <a:prstGeom prst="rect">
+            <a:avLst/>
+          </a:prstGeom>
+          <a:noFill/>
+        </p:spPr>
+        <p:txBody>
+          <a:bodyPr wrap="square" rtlCol="0">
+            <a:spAutoFit/>
+          </a:bodyPr>
+          <a:lstStyle/>
+          <a:p>
+            <a:r>
+              <a:rPr lang="en-US" dirty="0" err="1"/>
+              <a:t>mov</a:t>
+            </a:r>
+            <a:r>
+              <a:rPr lang="en-US" dirty="0"/>
+              <a:t> edx,-1 </a:t>
+            </a:r>
+          </a:p>
+          <a:p>
+            <a:r>
+              <a:rPr lang="en-US" dirty="0" err="1"/>
+              <a:t>cmp</a:t>
+            </a:r>
+            <a:r>
+              <a:rPr lang="en-US" dirty="0"/>
+              <a:t> edx,0 </a:t>
+            </a:r>
+          </a:p>
+          <a:p>
+            <a:r>
+              <a:rPr lang="en-US" dirty="0" err="1"/>
+              <a:t>jnl</a:t>
+            </a:r>
+            <a:r>
+              <a:rPr lang="en-US" dirty="0"/>
+              <a:t> </a:t>
+            </a:r>
+            <a:r>
+              <a:rPr lang="en-US" dirty="0" smtClean="0"/>
+              <a:t>L5 </a:t>
+            </a:r>
+            <a:r>
+              <a:rPr lang="en-US" dirty="0"/>
+              <a:t>		; jump not taken (-1 &gt;= 0 is false) </a:t>
+            </a:r>
+          </a:p>
+          <a:p>
+            <a:r>
+              <a:rPr lang="en-US" dirty="0" err="1"/>
+              <a:t>jnle</a:t>
+            </a:r>
+            <a:r>
+              <a:rPr lang="en-US" dirty="0"/>
+              <a:t> L5 		; jump not taken (-1 &gt; 0 is false) </a:t>
+            </a:r>
+          </a:p>
+          <a:p>
+            <a:r>
+              <a:rPr lang="en-US" dirty="0" err="1"/>
+              <a:t>jl</a:t>
+            </a:r>
+            <a:r>
+              <a:rPr lang="en-US" dirty="0"/>
+              <a:t> L1 		; jump is taken (-1 &lt; 0 is true)</a:t>
+            </a:r>
+          </a:p>
+          <a:p>
+            <a:endParaRPr lang="en-US" dirty="0"/>
+          </a:p>
+        </p:txBody>
+      </p:sp>
+    </p:spTree>
+    <p:extLst>
+      <p:ext uri="{BB962C8B-B14F-4D97-AF65-F5344CB8AC3E}">
+        <p14:creationId xmlns:p14="http://schemas.microsoft.com/office/powerpoint/2010/main" val="1003477234"/>
+      </p:ext>
+    </p:extLst>
+  </p:cSld>
+  <p:clrMapOvr>
+    <a:masterClrMapping/>
+  </p:clrMapOvr>
+  <mc:AlternateContent xmlns:mc="http://schemas.openxmlformats.org/markup-compatibility/2006" xmlns:p14="http://schemas.microsoft.com/office/powerpoint/2010/main">
+    <mc:Choice Requires="p14">
+      <p:transition spd="med" p14:dur="700">
+        <p:fade/>
+      </p:transition>
+    </mc:Choice>
+    <mc:Fallback xmlns="">
+      <p:transition spd="med">
+        <p:fade/>
+      </p:transition>
+    </mc:Fallback>
+  </mc:AlternateContent>
+</p:sld>
+</file>
+
+<file path=ppt/slides/slide11.xml><?xml version="1.0" encoding="utf-8"?>
+<p:sld xmlns:a="http://schemas.openxmlformats.org/drawingml/2006/main" xmlns:r="http://schemas.openxmlformats.org/officeDocument/2006/relationships" xmlns:p="http://schemas.openxmlformats.org/presentationml/2006/main">
+  <p:cSld>
+    <p:spTree>
+      <p:nvGrpSpPr>
+        <p:cNvPr id="1" name=""/>
+        <p:cNvGrpSpPr/>
+        <p:nvPr/>
+      </p:nvGrpSpPr>
+      <p:grpSpPr>
+        <a:xfrm>
+          <a:off x="0" y="0"/>
+          <a:ext cx="0" cy="0"/>
+          <a:chOff x="0" y="0"/>
+          <a:chExt cx="0" cy="0"/>
+        </a:xfrm>
+      </p:grpSpPr>
+      <p:sp>
+        <p:nvSpPr>
+          <p:cNvPr id="2" name="Title 1"/>
+          <p:cNvSpPr>
+            <a:spLocks noGrp="1"/>
+          </p:cNvSpPr>
+          <p:nvPr>
+            <p:ph type="title"/>
+          </p:nvPr>
+        </p:nvSpPr>
+        <p:spPr/>
+        <p:txBody>
+          <a:bodyPr/>
+          <a:lstStyle/>
+          <a:p>
+            <a:r>
+              <a:rPr lang="en-US" dirty="0" smtClean="0"/>
+              <a:t>Example 2</a:t>
+            </a:r>
+            <a:endParaRPr lang="en-US" dirty="0"/>
+          </a:p>
+        </p:txBody>
+      </p:sp>
+      <p:sp>
+        <p:nvSpPr>
+          <p:cNvPr id="4" name="TextBox 3"/>
+          <p:cNvSpPr txBox="1"/>
+          <p:nvPr/>
+        </p:nvSpPr>
+        <p:spPr>
+          <a:xfrm>
+            <a:off x="1674812" y="1905000"/>
+            <a:ext cx="7848600" cy="1477328"/>
+          </a:xfrm>
+          <a:prstGeom prst="rect">
+            <a:avLst/>
+          </a:prstGeom>
+          <a:noFill/>
+        </p:spPr>
+        <p:txBody>
+          <a:bodyPr wrap="square" rtlCol="0">
+            <a:spAutoFit/>
+          </a:bodyPr>
+          <a:lstStyle/>
+          <a:p>
+            <a:r>
+              <a:rPr lang="en-US" dirty="0" err="1"/>
+              <a:t>mov</a:t>
+            </a:r>
+            <a:r>
+              <a:rPr lang="en-US" dirty="0"/>
+              <a:t> bx,+32 </a:t>
+            </a:r>
+            <a:endParaRPr lang="en-US" dirty="0" smtClean="0"/>
+          </a:p>
+          <a:p>
+            <a:r>
+              <a:rPr lang="en-US" dirty="0" err="1" smtClean="0"/>
+              <a:t>cmp</a:t>
+            </a:r>
+            <a:r>
+              <a:rPr lang="en-US" dirty="0" smtClean="0"/>
+              <a:t> </a:t>
+            </a:r>
+            <a:r>
+              <a:rPr lang="en-US" dirty="0"/>
+              <a:t>bx,-35 </a:t>
+            </a:r>
+            <a:endParaRPr lang="en-US" dirty="0" smtClean="0"/>
+          </a:p>
+          <a:p>
+            <a:r>
+              <a:rPr lang="en-US" dirty="0" err="1" smtClean="0"/>
+              <a:t>jng</a:t>
+            </a:r>
+            <a:r>
+              <a:rPr lang="en-US" dirty="0" smtClean="0"/>
+              <a:t> </a:t>
+            </a:r>
+            <a:r>
+              <a:rPr lang="en-US" dirty="0"/>
+              <a:t>L5 </a:t>
+            </a:r>
+            <a:r>
+              <a:rPr lang="en-US" dirty="0" smtClean="0"/>
+              <a:t>	; </a:t>
+            </a:r>
+            <a:r>
+              <a:rPr lang="en-US" dirty="0"/>
+              <a:t>jump not taken (+32 &lt;= -35 is false) </a:t>
+            </a:r>
+            <a:endParaRPr lang="en-US" dirty="0" smtClean="0"/>
+          </a:p>
+          <a:p>
+            <a:r>
+              <a:rPr lang="en-US" dirty="0" err="1" smtClean="0"/>
+              <a:t>jnge</a:t>
+            </a:r>
+            <a:r>
+              <a:rPr lang="en-US" dirty="0" smtClean="0"/>
+              <a:t> </a:t>
+            </a:r>
+            <a:r>
+              <a:rPr lang="en-US" dirty="0"/>
+              <a:t>L5 </a:t>
+            </a:r>
+            <a:r>
+              <a:rPr lang="en-US" dirty="0" smtClean="0"/>
+              <a:t>	; </a:t>
+            </a:r>
+            <a:r>
+              <a:rPr lang="en-US" dirty="0"/>
+              <a:t>jump not taken (+32 &lt; -35 is false) </a:t>
+            </a:r>
+            <a:endParaRPr lang="en-US" dirty="0" smtClean="0"/>
+          </a:p>
+          <a:p>
+            <a:r>
+              <a:rPr lang="en-US" dirty="0" err="1" smtClean="0"/>
+              <a:t>jge</a:t>
+            </a:r>
+            <a:r>
+              <a:rPr lang="en-US" dirty="0" smtClean="0"/>
+              <a:t> </a:t>
+            </a:r>
+            <a:r>
+              <a:rPr lang="en-US" dirty="0"/>
+              <a:t>L1 </a:t>
+            </a:r>
+            <a:r>
+              <a:rPr lang="en-US" dirty="0" smtClean="0"/>
+              <a:t>	; </a:t>
+            </a:r>
+            <a:r>
+              <a:rPr lang="en-US" dirty="0"/>
+              <a:t>jump is taken (+32 &gt;= -35 is true)</a:t>
+            </a:r>
+          </a:p>
+        </p:txBody>
+      </p:sp>
+    </p:spTree>
+    <p:extLst>
+      <p:ext uri="{BB962C8B-B14F-4D97-AF65-F5344CB8AC3E}">
+        <p14:creationId xmlns:p14="http://schemas.microsoft.com/office/powerpoint/2010/main" val="3713593927"/>
+      </p:ext>
+    </p:extLst>
+  </p:cSld>
+  <p:clrMapOvr>
+    <a:masterClrMapping/>
+  </p:clrMapOvr>
+  <mc:AlternateContent xmlns:mc="http://schemas.openxmlformats.org/markup-compatibility/2006" xmlns:p14="http://schemas.microsoft.com/office/powerpoint/2010/main">
+    <mc:Choice Requires="p14">
+      <p:transition spd="med" p14:dur="700">
+        <p:fade/>
+      </p:transition>
+    </mc:Choice>
+    <mc:Fallback xmlns="">
+      <p:transition spd="med">
+        <p:fade/>
+      </p:transition>
+    </mc:Fallback>
+  </mc:AlternateContent>
+</p:sld>
+</file>
+
+<file path=ppt/slides/slide12.xml><?xml version="1.0" encoding="utf-8"?>
+<p:sld xmlns:a="http://schemas.openxmlformats.org/drawingml/2006/main" xmlns:r="http://schemas.openxmlformats.org/officeDocument/2006/relationships" xmlns:p="http://schemas.openxmlformats.org/presentationml/2006/main">
+  <p:cSld>
+    <p:spTree>
+      <p:nvGrpSpPr>
+        <p:cNvPr id="1" name=""/>
+        <p:cNvGrpSpPr/>
+        <p:nvPr/>
+      </p:nvGrpSpPr>
+      <p:grpSpPr>
+        <a:xfrm>
+          <a:off x="0" y="0"/>
+          <a:ext cx="0" cy="0"/>
+          <a:chOff x="0" y="0"/>
+          <a:chExt cx="0" cy="0"/>
+        </a:xfrm>
+      </p:grpSpPr>
+      <p:sp>
+        <p:nvSpPr>
+          <p:cNvPr id="2" name="Title 1"/>
+          <p:cNvSpPr>
+            <a:spLocks noGrp="1"/>
+          </p:cNvSpPr>
+          <p:nvPr>
+            <p:ph type="title"/>
+          </p:nvPr>
+        </p:nvSpPr>
+        <p:spPr/>
+        <p:txBody>
+          <a:bodyPr/>
+          <a:lstStyle/>
+          <a:p>
+            <a:r>
+              <a:rPr lang="en-US" dirty="0" smtClean="0"/>
+              <a:t>Example 3</a:t>
+            </a:r>
+            <a:endParaRPr lang="en-US" dirty="0"/>
+          </a:p>
+        </p:txBody>
+      </p:sp>
+      <p:sp>
+        <p:nvSpPr>
+          <p:cNvPr id="4" name="TextBox 3"/>
+          <p:cNvSpPr txBox="1"/>
+          <p:nvPr/>
+        </p:nvSpPr>
+        <p:spPr>
+          <a:xfrm>
+            <a:off x="1674812" y="1905000"/>
+            <a:ext cx="7848600" cy="1200329"/>
+          </a:xfrm>
+          <a:prstGeom prst="rect">
+            <a:avLst/>
+          </a:prstGeom>
+          <a:noFill/>
+        </p:spPr>
+        <p:txBody>
+          <a:bodyPr wrap="square" rtlCol="0">
+            <a:spAutoFit/>
+          </a:bodyPr>
+          <a:lstStyle/>
+          <a:p>
+            <a:r>
+              <a:rPr lang="en-US" dirty="0" err="1"/>
+              <a:t>mov</a:t>
+            </a:r>
+            <a:r>
+              <a:rPr lang="en-US" dirty="0"/>
+              <a:t> al,+127 </a:t>
+            </a:r>
+            <a:r>
+              <a:rPr lang="en-US" dirty="0" smtClean="0"/>
+              <a:t>	; </a:t>
+            </a:r>
+            <a:r>
+              <a:rPr lang="en-US" dirty="0"/>
+              <a:t>hexadecimal value is 7Fh </a:t>
+            </a:r>
+            <a:endParaRPr lang="en-US" dirty="0" smtClean="0"/>
+          </a:p>
+          <a:p>
+            <a:r>
+              <a:rPr lang="en-US" dirty="0" err="1" smtClean="0"/>
+              <a:t>cmp</a:t>
+            </a:r>
+            <a:r>
+              <a:rPr lang="en-US" dirty="0" smtClean="0"/>
+              <a:t> </a:t>
+            </a:r>
+            <a:r>
+              <a:rPr lang="en-US" dirty="0"/>
+              <a:t>al,-128 </a:t>
+            </a:r>
+            <a:r>
+              <a:rPr lang="en-US" dirty="0" smtClean="0"/>
+              <a:t>	; </a:t>
+            </a:r>
+            <a:r>
+              <a:rPr lang="en-US" dirty="0"/>
+              <a:t>hexadecimal value is 80h </a:t>
+            </a:r>
+            <a:endParaRPr lang="en-US" dirty="0" smtClean="0"/>
+          </a:p>
+          <a:p>
+            <a:r>
+              <a:rPr lang="en-US" dirty="0" smtClean="0"/>
+              <a:t>ja </a:t>
+            </a:r>
+            <a:r>
+              <a:rPr lang="en-US" dirty="0" err="1"/>
+              <a:t>IsAbove</a:t>
+            </a:r>
+            <a:r>
+              <a:rPr lang="en-US" dirty="0"/>
+              <a:t> </a:t>
+            </a:r>
+            <a:r>
+              <a:rPr lang="en-US" dirty="0" smtClean="0"/>
+              <a:t>	; ?? </a:t>
+            </a:r>
+          </a:p>
+          <a:p>
+            <a:r>
+              <a:rPr lang="en-US" dirty="0" err="1" smtClean="0"/>
+              <a:t>jg</a:t>
+            </a:r>
+            <a:r>
+              <a:rPr lang="en-US" dirty="0" smtClean="0"/>
+              <a:t> </a:t>
+            </a:r>
+            <a:r>
+              <a:rPr lang="en-US" dirty="0" err="1"/>
+              <a:t>IsGreater</a:t>
+            </a:r>
+            <a:r>
+              <a:rPr lang="en-US" dirty="0"/>
+              <a:t> </a:t>
+            </a:r>
+            <a:r>
+              <a:rPr lang="en-US" dirty="0" smtClean="0"/>
+              <a:t>	; ??</a:t>
+            </a:r>
+            <a:endParaRPr lang="en-US" dirty="0"/>
+          </a:p>
+        </p:txBody>
+      </p:sp>
+    </p:spTree>
+    <p:extLst>
+      <p:ext uri="{BB962C8B-B14F-4D97-AF65-F5344CB8AC3E}">
+        <p14:creationId xmlns:p14="http://schemas.microsoft.com/office/powerpoint/2010/main" val="1546851925"/>
+      </p:ext>
+    </p:extLst>
+  </p:cSld>
+  <p:clrMapOvr>
+    <a:masterClrMapping/>
+  </p:clrMapOvr>
+  <mc:AlternateContent xmlns:mc="http://schemas.openxmlformats.org/markup-compatibility/2006" xmlns:p14="http://schemas.microsoft.com/office/powerpoint/2010/main">
+    <mc:Choice Requires="p14">
+      <p:transition spd="med" p14:dur="700">
+        <p:fade/>
+      </p:transition>
+    </mc:Choice>
+    <mc:Fallback xmlns="">
+      <p:transition spd="med">
+        <p:fade/>
+      </p:transition>
+    </mc:Fallback>
+  </mc:AlternateContent>
+</p:sld>
+</file>
+
+<file path=ppt/slides/slide13.xml><?xml version="1.0" encoding="utf-8"?>
+<p:sld xmlns:a="http://schemas.openxmlformats.org/drawingml/2006/main" xmlns:r="http://schemas.openxmlformats.org/officeDocument/2006/relationships" xmlns:p="http://schemas.openxmlformats.org/presentationml/2006/main">
+  <p:cSld>
+    <p:spTree>
+      <p:nvGrpSpPr>
+        <p:cNvPr id="1" name=""/>
+        <p:cNvGrpSpPr/>
+        <p:nvPr/>
+      </p:nvGrpSpPr>
+      <p:grpSpPr>
+        <a:xfrm>
+          <a:off x="0" y="0"/>
+          <a:ext cx="0" cy="0"/>
+          <a:chOff x="0" y="0"/>
+          <a:chExt cx="0" cy="0"/>
+        </a:xfrm>
+      </p:grpSpPr>
+      <p:sp>
+        <p:nvSpPr>
+          <p:cNvPr id="2" name="Title 1"/>
+          <p:cNvSpPr>
+            <a:spLocks noGrp="1"/>
+          </p:cNvSpPr>
+          <p:nvPr>
+            <p:ph type="title"/>
+          </p:nvPr>
+        </p:nvSpPr>
+        <p:spPr/>
+        <p:txBody>
+          <a:bodyPr/>
+          <a:lstStyle/>
+          <a:p>
+            <a:r>
+              <a:rPr lang="en-US" dirty="0" smtClean="0"/>
+              <a:t>Additional Concepts</a:t>
+            </a:r>
+            <a:endParaRPr lang="en-US" dirty="0"/>
+          </a:p>
+        </p:txBody>
+      </p:sp>
+      <p:sp>
+        <p:nvSpPr>
+          <p:cNvPr id="3" name="Content Placeholder 2"/>
+          <p:cNvSpPr>
+            <a:spLocks noGrp="1"/>
+          </p:cNvSpPr>
+          <p:nvPr>
+            <p:ph idx="1"/>
+          </p:nvPr>
+        </p:nvSpPr>
+        <p:spPr/>
+        <p:txBody>
+          <a:bodyPr/>
+          <a:lstStyle/>
+          <a:p>
+            <a:r>
+              <a:rPr lang="en-US" dirty="0" smtClean="0"/>
+              <a:t>Nested conditions</a:t>
+            </a:r>
+          </a:p>
+          <a:p>
+            <a:pPr lvl="1"/>
+            <a:r>
+              <a:rPr lang="en-US" dirty="0"/>
+              <a:t>Short </a:t>
+            </a:r>
+            <a:r>
+              <a:rPr lang="en-US" dirty="0" smtClean="0"/>
+              <a:t>Circuiting</a:t>
+            </a:r>
+          </a:p>
+          <a:p>
+            <a:r>
+              <a:rPr lang="en-US" dirty="0" smtClean="0"/>
+              <a:t>While loops</a:t>
+            </a:r>
+          </a:p>
+          <a:p>
+            <a:pPr lvl="1"/>
+            <a:r>
+              <a:rPr lang="en-US" dirty="0" smtClean="0"/>
+              <a:t>Book example page 212-213</a:t>
+            </a:r>
+          </a:p>
+          <a:p>
+            <a:r>
+              <a:rPr lang="en-US" dirty="0" smtClean="0"/>
+              <a:t>White Box Testing</a:t>
+            </a:r>
+          </a:p>
+          <a:p>
+            <a:r>
+              <a:rPr lang="en-US" dirty="0" smtClean="0"/>
+              <a:t>Control flow Directives</a:t>
+            </a:r>
+          </a:p>
+        </p:txBody>
+      </p:sp>
+    </p:spTree>
+    <p:extLst>
+      <p:ext uri="{BB962C8B-B14F-4D97-AF65-F5344CB8AC3E}">
+        <p14:creationId xmlns:p14="http://schemas.microsoft.com/office/powerpoint/2010/main" val="420109521"/>
+      </p:ext>
+    </p:extLst>
+  </p:cSld>
+  <p:clrMapOvr>
+    <a:masterClrMapping/>
+  </p:clrMapOvr>
+  <mc:AlternateContent xmlns:mc="http://schemas.openxmlformats.org/markup-compatibility/2006" xmlns:p14="http://schemas.microsoft.com/office/powerpoint/2010/main">
+    <mc:Choice Requires="p14">
+      <p:transition spd="med" p14:dur="700">
+        <p:fade/>
+      </p:transition>
+    </mc:Choice>
+    <mc:Fallback xmlns="">
+      <p:transition spd="med">
+        <p:fade/>
+      </p:transition>
+    </mc:Fallback>
+  </mc:AlternateContent>
+</p:sld>
+</file>
+
+<file path=ppt/slides/slide2.xml><?xml version="1.0" encoding="utf-8"?>
+<p:sld xmlns:a="http://schemas.openxmlformats.org/drawingml/2006/main" xmlns:r="http://schemas.openxmlformats.org/officeDocument/2006/relationships" xmlns:p="http://schemas.openxmlformats.org/presentationml/2006/main">
+  <p:cSld>
+    <p:spTree>
+      <p:nvGrpSpPr>
+        <p:cNvPr id="1" name=""/>
+        <p:cNvGrpSpPr/>
+        <p:nvPr/>
+      </p:nvGrpSpPr>
+      <p:grpSpPr>
+        <a:xfrm>
+          <a:off x="0" y="0"/>
+          <a:ext cx="0" cy="0"/>
+          <a:chOff x="0" y="0"/>
+          <a:chExt cx="0" cy="0"/>
+        </a:xfrm>
+      </p:grpSpPr>
+      <p:sp>
+        <p:nvSpPr>
+          <p:cNvPr id="2" name="Title 1"/>
+          <p:cNvSpPr>
+            <a:spLocks noGrp="1"/>
+          </p:cNvSpPr>
+          <p:nvPr>
+            <p:ph type="title"/>
+          </p:nvPr>
+        </p:nvSpPr>
+        <p:spPr/>
+        <p:txBody>
+          <a:bodyPr/>
+          <a:lstStyle/>
+          <a:p>
+            <a:r>
+              <a:rPr lang="en-US" dirty="0" smtClean="0"/>
+              <a:t>Discrete Math: Truth Tables</a:t>
+            </a:r>
+            <a:endParaRPr lang="en-US" dirty="0"/>
+          </a:p>
+        </p:txBody>
+      </p:sp>
+      <p:graphicFrame>
+        <p:nvGraphicFramePr>
+          <p:cNvPr id="5" name="Content Placeholder 4"/>
+          <p:cNvGraphicFramePr>
+            <a:graphicFrameLocks noGrp="1"/>
+          </p:cNvGraphicFramePr>
+          <p:nvPr>
+            <p:ph idx="1"/>
+            <p:extLst>
+              <p:ext uri="{D42A27DB-BD31-4B8C-83A1-F6EECF244321}">
+                <p14:modId xmlns:p14="http://schemas.microsoft.com/office/powerpoint/2010/main" val="257244566"/>
+              </p:ext>
+            </p:extLst>
+          </p:nvPr>
+        </p:nvGraphicFramePr>
+        <p:xfrm>
+          <a:off x="1522413" y="1905000"/>
+          <a:ext cx="9134478" cy="1854200"/>
+        </p:xfrm>
+        <a:graphic>
+          <a:graphicData uri="http://schemas.openxmlformats.org/drawingml/2006/table">
+            <a:tbl>
+              <a:tblPr firstRow="1" bandRow="1">
+                <a:tableStyleId>{5C22544A-7EE6-4342-B048-85BDC9FD1C3A}</a:tableStyleId>
+              </a:tblPr>
+              <a:tblGrid>
+                <a:gridCol w="1522413"/>
+                <a:gridCol w="1522413"/>
+                <a:gridCol w="1522413"/>
+                <a:gridCol w="1522413"/>
+                <a:gridCol w="1522413"/>
+                <a:gridCol w="1522413"/>
+              </a:tblGrid>
+              <a:tr h="370840">
+                <a:tc>
+                  <a:txBody>
+                    <a:bodyPr/>
+                    <a:lstStyle/>
+                    <a:p>
+                      <a:r>
+                        <a:rPr lang="en-US" dirty="0" smtClean="0"/>
+                        <a:t>X</a:t>
+                      </a:r>
+                      <a:endParaRPr lang="en-US" dirty="0"/>
+                    </a:p>
+                  </a:txBody>
+                  <a:tcPr/>
+                </a:tc>
+                <a:tc>
+                  <a:txBody>
+                    <a:bodyPr/>
+                    <a:lstStyle/>
+                    <a:p>
+                      <a:r>
+                        <a:rPr lang="en-US" dirty="0" smtClean="0"/>
+                        <a:t>Y</a:t>
+                      </a:r>
+                      <a:endParaRPr lang="en-US" dirty="0"/>
+                    </a:p>
+                  </a:txBody>
+                  <a:tcPr/>
+                </a:tc>
+                <a:tc>
+                  <a:txBody>
+                    <a:bodyPr/>
+                    <a:lstStyle/>
+                    <a:p>
+                      <a:r>
+                        <a:rPr lang="en-US" dirty="0" smtClean="0"/>
+                        <a:t>AND</a:t>
+                      </a:r>
+                      <a:endParaRPr lang="en-US" dirty="0"/>
+                    </a:p>
+                  </a:txBody>
+                  <a:tcPr/>
+                </a:tc>
+                <a:tc>
+                  <a:txBody>
+                    <a:bodyPr/>
+                    <a:lstStyle/>
+                    <a:p>
+                      <a:r>
+                        <a:rPr lang="en-US" dirty="0" smtClean="0"/>
+                        <a:t>OR</a:t>
+                      </a:r>
+                      <a:endParaRPr lang="en-US" dirty="0"/>
+                    </a:p>
+                  </a:txBody>
+                  <a:tcPr/>
+                </a:tc>
+                <a:tc>
+                  <a:txBody>
+                    <a:bodyPr/>
+                    <a:lstStyle/>
+                    <a:p>
+                      <a:r>
+                        <a:rPr lang="en-US" dirty="0" smtClean="0"/>
+                        <a:t>NOT</a:t>
+                      </a:r>
+                      <a:endParaRPr lang="en-US" dirty="0"/>
+                    </a:p>
+                  </a:txBody>
+                  <a:tcPr/>
+                </a:tc>
+                <a:tc>
+                  <a:txBody>
+                    <a:bodyPr/>
+                    <a:lstStyle/>
+                    <a:p>
+                      <a:r>
+                        <a:rPr lang="en-US" dirty="0" smtClean="0"/>
+                        <a:t>XOR</a:t>
+                      </a:r>
+                      <a:endParaRPr lang="en-US" dirty="0"/>
+                    </a:p>
+                  </a:txBody>
+                  <a:tcPr/>
+                </a:tc>
+              </a:tr>
+              <a:tr h="370840">
+                <a:tc>
+                  <a:txBody>
+                    <a:bodyPr/>
+                    <a:lstStyle/>
+                    <a:p>
+                      <a:r>
+                        <a:rPr lang="en-US" dirty="0" smtClean="0"/>
+                        <a:t>0</a:t>
+                      </a:r>
+                      <a:endParaRPr lang="en-US" dirty="0"/>
+                    </a:p>
+                  </a:txBody>
+                  <a:tcPr/>
+                </a:tc>
+                <a:tc>
+                  <a:txBody>
+                    <a:bodyPr/>
+                    <a:lstStyle/>
+                    <a:p>
+                      <a:r>
+                        <a:rPr lang="en-US" dirty="0" smtClean="0"/>
+                        <a:t>0</a:t>
+                      </a:r>
+                      <a:endParaRPr lang="en-US" dirty="0"/>
+                    </a:p>
+                  </a:txBody>
+                  <a:tcPr/>
+                </a:tc>
+                <a:tc>
+                  <a:txBody>
+                    <a:bodyPr/>
+                    <a:lstStyle/>
+                    <a:p>
+                      <a:r>
+                        <a:rPr lang="en-US" dirty="0" smtClean="0"/>
+                        <a:t>0</a:t>
+                      </a:r>
+                      <a:endParaRPr lang="en-US" dirty="0"/>
+                    </a:p>
+                  </a:txBody>
+                  <a:tcPr/>
+                </a:tc>
+                <a:tc>
+                  <a:txBody>
+                    <a:bodyPr/>
+                    <a:lstStyle/>
+                    <a:p>
+                      <a:r>
+                        <a:rPr lang="en-US" dirty="0" smtClean="0"/>
+                        <a:t>0</a:t>
+                      </a:r>
+                      <a:endParaRPr lang="en-US" dirty="0"/>
+                    </a:p>
+                  </a:txBody>
+                  <a:tcPr/>
+                </a:tc>
+                <a:tc>
+                  <a:txBody>
+                    <a:bodyPr/>
+                    <a:lstStyle/>
+                    <a:p>
+                      <a:r>
+                        <a:rPr lang="en-US" dirty="0" smtClean="0"/>
+                        <a:t>1,1</a:t>
+                      </a:r>
+                      <a:endParaRPr lang="en-US" dirty="0"/>
+                    </a:p>
+                  </a:txBody>
+                  <a:tcPr/>
+                </a:tc>
+                <a:tc>
+                  <a:txBody>
+                    <a:bodyPr/>
+                    <a:lstStyle/>
+                    <a:p>
+                      <a:r>
+                        <a:rPr lang="en-US" dirty="0" smtClean="0"/>
+                        <a:t>0</a:t>
+                      </a:r>
+                      <a:endParaRPr lang="en-US" dirty="0"/>
+                    </a:p>
+                  </a:txBody>
+                  <a:tcPr/>
+                </a:tc>
+              </a:tr>
+              <a:tr h="370840">
+                <a:tc>
+                  <a:txBody>
+                    <a:bodyPr/>
+                    <a:lstStyle/>
+                    <a:p>
+                      <a:r>
+                        <a:rPr lang="en-US" dirty="0" smtClean="0"/>
+                        <a:t>0</a:t>
+                      </a:r>
+                      <a:endParaRPr lang="en-US" dirty="0"/>
+                    </a:p>
+                  </a:txBody>
+                  <a:tcPr/>
+                </a:tc>
+                <a:tc>
+                  <a:txBody>
+                    <a:bodyPr/>
+                    <a:lstStyle/>
+                    <a:p>
+                      <a:r>
+                        <a:rPr lang="en-US" dirty="0" smtClean="0"/>
+                        <a:t>1</a:t>
+                      </a:r>
+                      <a:endParaRPr lang="en-US" dirty="0"/>
+                    </a:p>
+                  </a:txBody>
+                  <a:tcPr/>
+                </a:tc>
+                <a:tc>
+                  <a:txBody>
+                    <a:bodyPr/>
+                    <a:lstStyle/>
+                    <a:p>
+                      <a:r>
+                        <a:rPr lang="en-US" dirty="0" smtClean="0"/>
+                        <a:t>0</a:t>
+                      </a:r>
+                      <a:endParaRPr lang="en-US" dirty="0"/>
+                    </a:p>
+                  </a:txBody>
+                  <a:tcPr/>
+                </a:tc>
+                <a:tc>
+                  <a:txBody>
+                    <a:bodyPr/>
+                    <a:lstStyle/>
+                    <a:p>
+                      <a:r>
+                        <a:rPr lang="en-US" dirty="0" smtClean="0"/>
+                        <a:t>1</a:t>
+                      </a:r>
+                      <a:endParaRPr lang="en-US" dirty="0"/>
+                    </a:p>
+                  </a:txBody>
+                  <a:tcPr/>
+                </a:tc>
+                <a:tc>
+                  <a:txBody>
+                    <a:bodyPr/>
+                    <a:lstStyle/>
+                    <a:p>
+                      <a:r>
+                        <a:rPr lang="en-US" dirty="0" smtClean="0"/>
+                        <a:t>1,0</a:t>
+                      </a:r>
+                      <a:endParaRPr lang="en-US" dirty="0"/>
+                    </a:p>
+                  </a:txBody>
+                  <a:tcPr/>
+                </a:tc>
+                <a:tc>
+                  <a:txBody>
+                    <a:bodyPr/>
+                    <a:lstStyle/>
+                    <a:p>
+                      <a:r>
+                        <a:rPr lang="en-US" dirty="0" smtClean="0"/>
+                        <a:t>1</a:t>
+                      </a:r>
+                      <a:endParaRPr lang="en-US" dirty="0"/>
+                    </a:p>
+                  </a:txBody>
+                  <a:tcPr/>
+                </a:tc>
+              </a:tr>
+              <a:tr h="370840">
+                <a:tc>
+                  <a:txBody>
+                    <a:bodyPr/>
+                    <a:lstStyle/>
+                    <a:p>
+                      <a:r>
+                        <a:rPr lang="en-US" dirty="0" smtClean="0"/>
+                        <a:t>1</a:t>
+                      </a:r>
+                      <a:endParaRPr lang="en-US" dirty="0"/>
+                    </a:p>
+                  </a:txBody>
+                  <a:tcPr/>
+                </a:tc>
+                <a:tc>
+                  <a:txBody>
+                    <a:bodyPr/>
+                    <a:lstStyle/>
+                    <a:p>
+                      <a:r>
+                        <a:rPr lang="en-US" dirty="0" smtClean="0"/>
+                        <a:t>0</a:t>
+                      </a:r>
+                      <a:endParaRPr lang="en-US" dirty="0"/>
+                    </a:p>
+                  </a:txBody>
+                  <a:tcPr/>
+                </a:tc>
+                <a:tc>
+                  <a:txBody>
+                    <a:bodyPr/>
+                    <a:lstStyle/>
+                    <a:p>
+                      <a:r>
+                        <a:rPr lang="en-US" dirty="0" smtClean="0"/>
+                        <a:t>0</a:t>
+                      </a:r>
+                      <a:endParaRPr lang="en-US" dirty="0"/>
+                    </a:p>
+                  </a:txBody>
+                  <a:tcPr/>
+                </a:tc>
+                <a:tc>
+                  <a:txBody>
+                    <a:bodyPr/>
+                    <a:lstStyle/>
+                    <a:p>
+                      <a:r>
+                        <a:rPr lang="en-US" dirty="0" smtClean="0"/>
+                        <a:t>1</a:t>
+                      </a:r>
+                      <a:endParaRPr lang="en-US" dirty="0"/>
+                    </a:p>
+                  </a:txBody>
+                  <a:tcPr/>
+                </a:tc>
+                <a:tc>
+                  <a:txBody>
+                    <a:bodyPr/>
+                    <a:lstStyle/>
+                    <a:p>
+                      <a:r>
+                        <a:rPr lang="en-US" dirty="0" smtClean="0"/>
+                        <a:t>0,1</a:t>
+                      </a:r>
+                      <a:endParaRPr lang="en-US" dirty="0"/>
+                    </a:p>
+                  </a:txBody>
+                  <a:tcPr/>
+                </a:tc>
+                <a:tc>
+                  <a:txBody>
+                    <a:bodyPr/>
+                    <a:lstStyle/>
+                    <a:p>
+                      <a:r>
+                        <a:rPr lang="en-US" dirty="0" smtClean="0"/>
+                        <a:t>1</a:t>
+                      </a:r>
+                      <a:endParaRPr lang="en-US" dirty="0"/>
+                    </a:p>
+                  </a:txBody>
+                  <a:tcPr/>
+                </a:tc>
+              </a:tr>
+              <a:tr h="370840">
+                <a:tc>
+                  <a:txBody>
+                    <a:bodyPr/>
+                    <a:lstStyle/>
+                    <a:p>
+                      <a:r>
+                        <a:rPr lang="en-US" dirty="0" smtClean="0"/>
+                        <a:t>1</a:t>
+                      </a:r>
+                      <a:endParaRPr lang="en-US" dirty="0"/>
+                    </a:p>
+                  </a:txBody>
+                  <a:tcPr/>
+                </a:tc>
+                <a:tc>
+                  <a:txBody>
+                    <a:bodyPr/>
+                    <a:lstStyle/>
+                    <a:p>
+                      <a:r>
+                        <a:rPr lang="en-US" dirty="0" smtClean="0"/>
+                        <a:t>1</a:t>
+                      </a:r>
+                      <a:endParaRPr lang="en-US" dirty="0"/>
+                    </a:p>
+                  </a:txBody>
+                  <a:tcPr/>
+                </a:tc>
+                <a:tc>
+                  <a:txBody>
+                    <a:bodyPr/>
+                    <a:lstStyle/>
+                    <a:p>
+                      <a:r>
+                        <a:rPr lang="en-US" dirty="0" smtClean="0"/>
+                        <a:t>1</a:t>
+                      </a:r>
+                      <a:endParaRPr lang="en-US" dirty="0"/>
+                    </a:p>
+                  </a:txBody>
+                  <a:tcPr/>
+                </a:tc>
+                <a:tc>
+                  <a:txBody>
+                    <a:bodyPr/>
+                    <a:lstStyle/>
+                    <a:p>
+                      <a:r>
+                        <a:rPr lang="en-US" dirty="0" smtClean="0"/>
+                        <a:t>1</a:t>
+                      </a:r>
+                      <a:endParaRPr lang="en-US" dirty="0"/>
+                    </a:p>
+                  </a:txBody>
+                  <a:tcPr/>
+                </a:tc>
+                <a:tc>
+                  <a:txBody>
+                    <a:bodyPr/>
+                    <a:lstStyle/>
+                    <a:p>
+                      <a:r>
+                        <a:rPr lang="en-US" dirty="0" smtClean="0"/>
+                        <a:t>0,0</a:t>
+                      </a:r>
+                      <a:endParaRPr lang="en-US" dirty="0"/>
+                    </a:p>
+                  </a:txBody>
+                  <a:tcPr/>
+                </a:tc>
+                <a:tc>
+                  <a:txBody>
+                    <a:bodyPr/>
+                    <a:lstStyle/>
+                    <a:p>
+                      <a:r>
+                        <a:rPr lang="en-US" dirty="0" smtClean="0"/>
+                        <a:t>0</a:t>
+                      </a:r>
+                      <a:endParaRPr lang="en-US" dirty="0"/>
+                    </a:p>
+                  </a:txBody>
+                  <a:tcPr/>
+                </a:tc>
+              </a:tr>
+            </a:tbl>
+          </a:graphicData>
+        </a:graphic>
+      </p:graphicFrame>
+    </p:spTree>
+    <p:extLst>
+      <p:ext uri="{BB962C8B-B14F-4D97-AF65-F5344CB8AC3E}">
+        <p14:creationId xmlns:p14="http://schemas.microsoft.com/office/powerpoint/2010/main" val="707321351"/>
+      </p:ext>
+    </p:extLst>
+  </p:cSld>
+  <p:clrMapOvr>
+    <a:masterClrMapping/>
+  </p:clrMapOvr>
+  <mc:AlternateContent xmlns:mc="http://schemas.openxmlformats.org/markup-compatibility/2006" xmlns:p14="http://schemas.microsoft.com/office/powerpoint/2010/main">
+    <mc:Choice Requires="p14">
+      <p:transition spd="med" p14:dur="700">
+        <p:fade/>
+      </p:transition>
+    </mc:Choice>
+    <mc:Fallback xmlns="">
+      <p:transition spd="med">
+        <p:fade/>
+      </p:transition>
+    </mc:Fallback>
+  </mc:AlternateContent>
+</p:sld>
+</file>
+
+<file path=ppt/slides/slide3.xml><?xml version="1.0" encoding="utf-8"?>
+<p:sld xmlns:a="http://schemas.openxmlformats.org/drawingml/2006/main" xmlns:r="http://schemas.openxmlformats.org/officeDocument/2006/relationships" xmlns:p="http://schemas.openxmlformats.org/presentationml/2006/main">
+  <p:cSld>
+    <p:spTree>
+      <p:nvGrpSpPr>
+        <p:cNvPr id="1" name=""/>
+        <p:cNvGrpSpPr/>
+        <p:nvPr/>
+      </p:nvGrpSpPr>
+      <p:grpSpPr>
+        <a:xfrm>
+          <a:off x="0" y="0"/>
+          <a:ext cx="0" cy="0"/>
+          <a:chOff x="0" y="0"/>
+          <a:chExt cx="0" cy="0"/>
+        </a:xfrm>
+      </p:grpSpPr>
+      <p:sp>
+        <p:nvSpPr>
+          <p:cNvPr id="2" name="Title 1"/>
+          <p:cNvSpPr>
+            <a:spLocks noGrp="1"/>
+          </p:cNvSpPr>
+          <p:nvPr>
+            <p:ph type="title"/>
+          </p:nvPr>
+        </p:nvSpPr>
+        <p:spPr/>
+        <p:txBody>
+          <a:bodyPr/>
+          <a:lstStyle/>
+          <a:p>
+            <a:r>
+              <a:rPr lang="en-US" dirty="0" smtClean="0"/>
+              <a:t>Logical Operators: AND</a:t>
+            </a:r>
+            <a:endParaRPr lang="en-US" dirty="0"/>
+          </a:p>
+        </p:txBody>
+      </p:sp>
+      <p:sp>
+        <p:nvSpPr>
+          <p:cNvPr id="3" name="Content Placeholder 2"/>
+          <p:cNvSpPr>
+            <a:spLocks noGrp="1"/>
+          </p:cNvSpPr>
+          <p:nvPr>
+            <p:ph idx="1"/>
+          </p:nvPr>
+        </p:nvSpPr>
+        <p:spPr>
+          <a:xfrm>
+            <a:off x="1522413" y="1904999"/>
+            <a:ext cx="9134391" cy="4724401"/>
+          </a:xfrm>
+        </p:spPr>
+        <p:txBody>
+          <a:bodyPr>
+            <a:normAutofit fontScale="70000" lnSpcReduction="20000"/>
+          </a:bodyPr>
+          <a:lstStyle/>
+          <a:p>
+            <a:r>
+              <a:rPr lang="en-US" dirty="0" smtClean="0"/>
+              <a:t>Performs a bit-wise AND on two operands</a:t>
+            </a:r>
+          </a:p>
+          <a:p>
+            <a:pPr lvl="1"/>
+            <a:r>
+              <a:rPr lang="en-US" dirty="0" err="1" smtClean="0"/>
+              <a:t>reg,reg</a:t>
+            </a:r>
+            <a:r>
+              <a:rPr lang="en-US" dirty="0" smtClean="0"/>
+              <a:t>   </a:t>
+            </a:r>
+          </a:p>
+          <a:p>
+            <a:pPr lvl="1"/>
+            <a:r>
+              <a:rPr lang="en-US" dirty="0" err="1" smtClean="0"/>
+              <a:t>reg,mem</a:t>
+            </a:r>
+            <a:endParaRPr lang="en-US" dirty="0" smtClean="0"/>
+          </a:p>
+          <a:p>
+            <a:pPr lvl="1"/>
+            <a:r>
+              <a:rPr lang="en-US" dirty="0" err="1"/>
+              <a:t>r</a:t>
+            </a:r>
+            <a:r>
+              <a:rPr lang="en-US" dirty="0" err="1" smtClean="0"/>
+              <a:t>eg,imm</a:t>
+            </a:r>
+            <a:endParaRPr lang="en-US" dirty="0" smtClean="0"/>
+          </a:p>
+          <a:p>
+            <a:pPr lvl="1"/>
+            <a:r>
+              <a:rPr lang="en-US" dirty="0" err="1"/>
+              <a:t>m</a:t>
+            </a:r>
+            <a:r>
+              <a:rPr lang="en-US" dirty="0" err="1" smtClean="0"/>
+              <a:t>em,reg</a:t>
+            </a:r>
+            <a:endParaRPr lang="en-US" dirty="0" smtClean="0"/>
+          </a:p>
+          <a:p>
+            <a:pPr lvl="1"/>
+            <a:r>
+              <a:rPr lang="en-US" dirty="0" err="1" smtClean="0"/>
+              <a:t>mem,imm</a:t>
+            </a:r>
+            <a:endParaRPr lang="en-US" dirty="0" smtClean="0"/>
+          </a:p>
+          <a:p>
+            <a:pPr marL="231775" lvl="1" indent="0">
+              <a:buNone/>
+            </a:pPr>
+            <a:r>
+              <a:rPr lang="en-US" dirty="0"/>
+              <a:t>.data </a:t>
+            </a:r>
+            <a:endParaRPr lang="en-US" dirty="0" smtClean="0"/>
+          </a:p>
+          <a:p>
+            <a:pPr marL="231775" lvl="1" indent="0">
+              <a:buNone/>
+            </a:pPr>
+            <a:r>
+              <a:rPr lang="en-US" dirty="0"/>
+              <a:t>	</a:t>
+            </a:r>
+            <a:r>
+              <a:rPr lang="en-US" dirty="0" smtClean="0"/>
+              <a:t>array </a:t>
+            </a:r>
+            <a:r>
+              <a:rPr lang="en-US" dirty="0"/>
+              <a:t>BYTE 50 DUP(?) </a:t>
+            </a:r>
+            <a:endParaRPr lang="en-US" dirty="0" smtClean="0"/>
+          </a:p>
+          <a:p>
+            <a:pPr marL="231775" lvl="1" indent="0">
+              <a:buNone/>
+            </a:pPr>
+            <a:r>
+              <a:rPr lang="en-US" dirty="0" smtClean="0"/>
+              <a:t>.</a:t>
+            </a:r>
+            <a:r>
+              <a:rPr lang="en-US" dirty="0"/>
+              <a:t>code </a:t>
+            </a:r>
+            <a:endParaRPr lang="en-US" dirty="0" smtClean="0"/>
+          </a:p>
+          <a:p>
+            <a:pPr marL="231775" lvl="1" indent="0">
+              <a:buNone/>
+            </a:pPr>
+            <a:r>
+              <a:rPr lang="en-US" dirty="0"/>
+              <a:t>	</a:t>
+            </a:r>
+            <a:r>
+              <a:rPr lang="en-US" dirty="0" err="1" smtClean="0"/>
+              <a:t>mov</a:t>
+            </a:r>
+            <a:r>
+              <a:rPr lang="en-US" dirty="0" smtClean="0"/>
+              <a:t> </a:t>
+            </a:r>
+            <a:r>
+              <a:rPr lang="en-US" dirty="0" err="1"/>
+              <a:t>ecx,LENGTHOF</a:t>
+            </a:r>
+            <a:r>
+              <a:rPr lang="en-US" dirty="0"/>
+              <a:t> array </a:t>
+            </a:r>
+            <a:endParaRPr lang="en-US" dirty="0" smtClean="0"/>
+          </a:p>
+          <a:p>
+            <a:pPr marL="231775" lvl="1" indent="0">
+              <a:buNone/>
+            </a:pPr>
+            <a:r>
+              <a:rPr lang="en-US" dirty="0" smtClean="0"/>
+              <a:t>	</a:t>
+            </a:r>
+            <a:r>
+              <a:rPr lang="en-US" dirty="0" err="1" smtClean="0"/>
+              <a:t>mov</a:t>
+            </a:r>
+            <a:r>
+              <a:rPr lang="en-US" dirty="0" smtClean="0"/>
+              <a:t> </a:t>
+            </a:r>
+            <a:r>
+              <a:rPr lang="en-US" dirty="0" err="1"/>
+              <a:t>esi,OFFSET</a:t>
+            </a:r>
+            <a:r>
+              <a:rPr lang="en-US" dirty="0"/>
+              <a:t> array </a:t>
+            </a:r>
+            <a:endParaRPr lang="en-US" dirty="0" smtClean="0"/>
+          </a:p>
+          <a:p>
+            <a:pPr marL="231775" lvl="1" indent="0">
+              <a:buNone/>
+            </a:pPr>
+            <a:r>
+              <a:rPr lang="en-US" dirty="0" smtClean="0"/>
+              <a:t>	L1</a:t>
+            </a:r>
+            <a:r>
+              <a:rPr lang="en-US" dirty="0"/>
+              <a:t>: </a:t>
+            </a:r>
+            <a:endParaRPr lang="en-US" dirty="0" smtClean="0"/>
+          </a:p>
+          <a:p>
+            <a:pPr marL="231775" lvl="1" indent="0">
+              <a:buNone/>
+            </a:pPr>
+            <a:r>
+              <a:rPr lang="en-US" dirty="0" smtClean="0"/>
+              <a:t>	and </a:t>
+            </a:r>
+            <a:r>
+              <a:rPr lang="en-US" dirty="0"/>
+              <a:t>BYTE PTR [</a:t>
+            </a:r>
+            <a:r>
+              <a:rPr lang="en-US" dirty="0" err="1"/>
+              <a:t>esi</a:t>
+            </a:r>
+            <a:r>
+              <a:rPr lang="en-US" dirty="0"/>
+              <a:t>],11011111b ; clear bit 5 </a:t>
+            </a:r>
+            <a:endParaRPr lang="en-US" dirty="0" smtClean="0"/>
+          </a:p>
+          <a:p>
+            <a:pPr marL="231775" lvl="1" indent="0">
+              <a:buNone/>
+            </a:pPr>
+            <a:r>
+              <a:rPr lang="en-US" dirty="0"/>
+              <a:t>	</a:t>
+            </a:r>
+            <a:r>
+              <a:rPr lang="en-US" dirty="0" err="1" smtClean="0"/>
+              <a:t>inc</a:t>
+            </a:r>
+            <a:r>
+              <a:rPr lang="en-US" dirty="0" smtClean="0"/>
+              <a:t> </a:t>
+            </a:r>
+            <a:r>
+              <a:rPr lang="en-US" dirty="0" err="1"/>
+              <a:t>esi</a:t>
+            </a:r>
+            <a:r>
+              <a:rPr lang="en-US" dirty="0"/>
+              <a:t> </a:t>
+            </a:r>
+            <a:endParaRPr lang="en-US" dirty="0" smtClean="0"/>
+          </a:p>
+          <a:p>
+            <a:pPr marL="231775" lvl="1" indent="0">
+              <a:buNone/>
+            </a:pPr>
+            <a:r>
+              <a:rPr lang="en-US" dirty="0" smtClean="0"/>
+              <a:t>	loop </a:t>
+            </a:r>
+            <a:r>
+              <a:rPr lang="en-US" dirty="0"/>
+              <a:t>L1</a:t>
+            </a:r>
+            <a:endParaRPr lang="en-US" dirty="0" smtClean="0"/>
+          </a:p>
+          <a:p>
+            <a:endParaRPr lang="en-US" dirty="0"/>
+          </a:p>
+        </p:txBody>
+      </p:sp>
+    </p:spTree>
+    <p:extLst>
+      <p:ext uri="{BB962C8B-B14F-4D97-AF65-F5344CB8AC3E}">
+        <p14:creationId xmlns:p14="http://schemas.microsoft.com/office/powerpoint/2010/main" val="1283726129"/>
+      </p:ext>
+    </p:extLst>
+  </p:cSld>
+  <p:clrMapOvr>
+    <a:masterClrMapping/>
+  </p:clrMapOvr>
+  <mc:AlternateContent xmlns:mc="http://schemas.openxmlformats.org/markup-compatibility/2006" xmlns:p14="http://schemas.microsoft.com/office/powerpoint/2010/main">
+    <mc:Choice Requires="p14">
+      <p:transition spd="med" p14:dur="700">
+        <p:fade/>
+      </p:transition>
+    </mc:Choice>
+    <mc:Fallback xmlns="">
+      <p:transition spd="med">
+        <p:fade/>
+      </p:transition>
+    </mc:Fallback>
+  </mc:AlternateContent>
+</p:sld>
+</file>
+
+<file path=ppt/slides/slide4.xml><?xml version="1.0" encoding="utf-8"?>
+<p:sld xmlns:a="http://schemas.openxmlformats.org/drawingml/2006/main" xmlns:r="http://schemas.openxmlformats.org/officeDocument/2006/relationships" xmlns:p="http://schemas.openxmlformats.org/presentationml/2006/main">
+  <p:cSld>
+    <p:spTree>
+      <p:nvGrpSpPr>
+        <p:cNvPr id="1" name=""/>
+        <p:cNvGrpSpPr/>
+        <p:nvPr/>
+      </p:nvGrpSpPr>
+      <p:grpSpPr>
+        <a:xfrm>
+          <a:off x="0" y="0"/>
+          <a:ext cx="0" cy="0"/>
+          <a:chOff x="0" y="0"/>
+          <a:chExt cx="0" cy="0"/>
+        </a:xfrm>
+      </p:grpSpPr>
+      <p:sp>
+        <p:nvSpPr>
+          <p:cNvPr id="2" name="Title 1"/>
+          <p:cNvSpPr>
+            <a:spLocks noGrp="1"/>
+          </p:cNvSpPr>
+          <p:nvPr>
+            <p:ph type="title"/>
+          </p:nvPr>
+        </p:nvSpPr>
+        <p:spPr/>
+        <p:txBody>
+          <a:bodyPr/>
+          <a:lstStyle/>
+          <a:p>
+            <a:r>
+              <a:rPr lang="en-US" dirty="0" smtClean="0"/>
+              <a:t>Logical Operators: OR</a:t>
+            </a:r>
+            <a:endParaRPr lang="en-US" dirty="0"/>
+          </a:p>
+        </p:txBody>
+      </p:sp>
+      <p:sp>
+        <p:nvSpPr>
+          <p:cNvPr id="3" name="Content Placeholder 2"/>
+          <p:cNvSpPr>
+            <a:spLocks noGrp="1"/>
+          </p:cNvSpPr>
+          <p:nvPr>
+            <p:ph idx="1"/>
+          </p:nvPr>
+        </p:nvSpPr>
+        <p:spPr>
+          <a:xfrm>
+            <a:off x="1522413" y="1904999"/>
+            <a:ext cx="9134391" cy="4724401"/>
+          </a:xfrm>
+        </p:spPr>
+        <p:txBody>
+          <a:bodyPr>
+            <a:normAutofit/>
+          </a:bodyPr>
+          <a:lstStyle/>
+          <a:p>
+            <a:r>
+              <a:rPr lang="en-US" dirty="0" smtClean="0"/>
+              <a:t>Performs a bit-wise OR on two operands</a:t>
+            </a:r>
+          </a:p>
+          <a:p>
+            <a:pPr lvl="1"/>
+            <a:r>
+              <a:rPr lang="en-US" dirty="0" err="1" smtClean="0"/>
+              <a:t>reg,reg</a:t>
+            </a:r>
+            <a:r>
+              <a:rPr lang="en-US" dirty="0" smtClean="0"/>
+              <a:t>   </a:t>
+            </a:r>
+          </a:p>
+          <a:p>
+            <a:pPr lvl="1"/>
+            <a:r>
+              <a:rPr lang="en-US" dirty="0" err="1" smtClean="0"/>
+              <a:t>reg,mem</a:t>
+            </a:r>
+            <a:endParaRPr lang="en-US" dirty="0" smtClean="0"/>
+          </a:p>
+          <a:p>
+            <a:pPr lvl="1"/>
+            <a:r>
+              <a:rPr lang="en-US" dirty="0" err="1"/>
+              <a:t>r</a:t>
+            </a:r>
+            <a:r>
+              <a:rPr lang="en-US" dirty="0" err="1" smtClean="0"/>
+              <a:t>eg,imm</a:t>
+            </a:r>
+            <a:endParaRPr lang="en-US" dirty="0" smtClean="0"/>
+          </a:p>
+          <a:p>
+            <a:pPr lvl="1"/>
+            <a:r>
+              <a:rPr lang="en-US" dirty="0" err="1"/>
+              <a:t>m</a:t>
+            </a:r>
+            <a:r>
+              <a:rPr lang="en-US" dirty="0" err="1" smtClean="0"/>
+              <a:t>em,reg</a:t>
+            </a:r>
+            <a:endParaRPr lang="en-US" dirty="0" smtClean="0"/>
+          </a:p>
+          <a:p>
+            <a:pPr lvl="1"/>
+            <a:r>
+              <a:rPr lang="en-US" dirty="0" err="1" smtClean="0"/>
+              <a:t>mem,imm</a:t>
+            </a:r>
+            <a:endParaRPr lang="en-US" dirty="0" smtClean="0"/>
+          </a:p>
+          <a:p>
+            <a:pPr marL="0" indent="0">
+              <a:buNone/>
+            </a:pPr>
+            <a:endParaRPr lang="en-US" dirty="0"/>
+          </a:p>
+        </p:txBody>
+      </p:sp>
+    </p:spTree>
+    <p:extLst>
+      <p:ext uri="{BB962C8B-B14F-4D97-AF65-F5344CB8AC3E}">
+        <p14:creationId xmlns:p14="http://schemas.microsoft.com/office/powerpoint/2010/main" val="818026108"/>
+      </p:ext>
+    </p:extLst>
+  </p:cSld>
+  <p:clrMapOvr>
+    <a:masterClrMapping/>
+  </p:clrMapOvr>
+  <mc:AlternateContent xmlns:mc="http://schemas.openxmlformats.org/markup-compatibility/2006" xmlns:p14="http://schemas.microsoft.com/office/powerpoint/2010/main">
+    <mc:Choice Requires="p14">
+      <p:transition spd="med" p14:dur="700">
+        <p:fade/>
+      </p:transition>
+    </mc:Choice>
+    <mc:Fallback xmlns="">
+      <p:transition spd="med">
+        <p:fade/>
+      </p:transition>
+    </mc:Fallback>
+  </mc:AlternateContent>
+</p:sld>
+</file>
+
+<file path=ppt/slides/slide5.xml><?xml version="1.0" encoding="utf-8"?>
+<p:sld xmlns:a="http://schemas.openxmlformats.org/drawingml/2006/main" xmlns:r="http://schemas.openxmlformats.org/officeDocument/2006/relationships" xmlns:p="http://schemas.openxmlformats.org/presentationml/2006/main">
+  <p:cSld>
+    <p:spTree>
+      <p:nvGrpSpPr>
+        <p:cNvPr id="1" name=""/>
+        <p:cNvGrpSpPr/>
+        <p:nvPr/>
+      </p:nvGrpSpPr>
+      <p:grpSpPr>
+        <a:xfrm>
+          <a:off x="0" y="0"/>
+          <a:ext cx="0" cy="0"/>
+          <a:chOff x="0" y="0"/>
+          <a:chExt cx="0" cy="0"/>
+        </a:xfrm>
+      </p:grpSpPr>
+      <p:sp>
+        <p:nvSpPr>
+          <p:cNvPr id="2" name="Title 1"/>
+          <p:cNvSpPr>
+            <a:spLocks noGrp="1"/>
+          </p:cNvSpPr>
+          <p:nvPr>
+            <p:ph type="title"/>
+          </p:nvPr>
+        </p:nvSpPr>
+        <p:spPr/>
+        <p:txBody>
+          <a:bodyPr/>
+          <a:lstStyle/>
+          <a:p>
+            <a:r>
+              <a:rPr lang="en-US" dirty="0" smtClean="0"/>
+              <a:t>Logical Operators: </a:t>
+            </a:r>
+            <a:r>
+              <a:rPr lang="en-US" dirty="0"/>
+              <a:t>X</a:t>
+            </a:r>
+            <a:r>
+              <a:rPr lang="en-US" dirty="0" smtClean="0"/>
+              <a:t>OR</a:t>
+            </a:r>
+            <a:endParaRPr lang="en-US" dirty="0"/>
+          </a:p>
+        </p:txBody>
+      </p:sp>
+      <p:sp>
+        <p:nvSpPr>
+          <p:cNvPr id="3" name="Content Placeholder 2"/>
+          <p:cNvSpPr>
+            <a:spLocks noGrp="1"/>
+          </p:cNvSpPr>
+          <p:nvPr>
+            <p:ph idx="1"/>
+          </p:nvPr>
+        </p:nvSpPr>
+        <p:spPr>
+          <a:xfrm>
+            <a:off x="1522413" y="1904999"/>
+            <a:ext cx="9134391" cy="4724401"/>
+          </a:xfrm>
+        </p:spPr>
+        <p:txBody>
+          <a:bodyPr>
+            <a:normAutofit/>
+          </a:bodyPr>
+          <a:lstStyle/>
+          <a:p>
+            <a:r>
+              <a:rPr lang="en-US" dirty="0" smtClean="0"/>
+              <a:t>Performs a bit-wise OR on two operands</a:t>
+            </a:r>
+          </a:p>
+          <a:p>
+            <a:pPr lvl="1"/>
+            <a:r>
+              <a:rPr lang="en-US" dirty="0" err="1" smtClean="0"/>
+              <a:t>reg,reg</a:t>
+            </a:r>
+            <a:r>
+              <a:rPr lang="en-US" dirty="0" smtClean="0"/>
+              <a:t>   </a:t>
+            </a:r>
+          </a:p>
+          <a:p>
+            <a:pPr lvl="1"/>
+            <a:r>
+              <a:rPr lang="en-US" dirty="0" err="1" smtClean="0"/>
+              <a:t>reg,mem</a:t>
+            </a:r>
+            <a:endParaRPr lang="en-US" dirty="0" smtClean="0"/>
+          </a:p>
+          <a:p>
+            <a:pPr lvl="1"/>
+            <a:r>
+              <a:rPr lang="en-US" dirty="0" err="1"/>
+              <a:t>r</a:t>
+            </a:r>
+            <a:r>
+              <a:rPr lang="en-US" dirty="0" err="1" smtClean="0"/>
+              <a:t>eg,imm</a:t>
+            </a:r>
+            <a:endParaRPr lang="en-US" dirty="0" smtClean="0"/>
+          </a:p>
+          <a:p>
+            <a:pPr lvl="1"/>
+            <a:r>
+              <a:rPr lang="en-US" dirty="0" err="1"/>
+              <a:t>m</a:t>
+            </a:r>
+            <a:r>
+              <a:rPr lang="en-US" dirty="0" err="1" smtClean="0"/>
+              <a:t>em,reg</a:t>
+            </a:r>
+            <a:endParaRPr lang="en-US" dirty="0" smtClean="0"/>
+          </a:p>
+          <a:p>
+            <a:pPr lvl="1"/>
+            <a:r>
+              <a:rPr lang="en-US" dirty="0" err="1" smtClean="0"/>
+              <a:t>mem,imm</a:t>
+            </a:r>
+            <a:endParaRPr lang="en-US" dirty="0" smtClean="0"/>
+          </a:p>
+          <a:p>
+            <a:pPr marL="0" indent="0">
+              <a:buNone/>
+            </a:pPr>
+            <a:endParaRPr lang="en-US" dirty="0"/>
+          </a:p>
+        </p:txBody>
+      </p:sp>
+    </p:spTree>
+    <p:extLst>
+      <p:ext uri="{BB962C8B-B14F-4D97-AF65-F5344CB8AC3E}">
+        <p14:creationId xmlns:p14="http://schemas.microsoft.com/office/powerpoint/2010/main" val="3483013550"/>
+      </p:ext>
+    </p:extLst>
+  </p:cSld>
+  <p:clrMapOvr>
+    <a:masterClrMapping/>
+  </p:clrMapOvr>
+  <mc:AlternateContent xmlns:mc="http://schemas.openxmlformats.org/markup-compatibility/2006" xmlns:p14="http://schemas.microsoft.com/office/powerpoint/2010/main">
+    <mc:Choice Requires="p14">
+      <p:transition spd="med" p14:dur="700">
+        <p:fade/>
+      </p:transition>
+    </mc:Choice>
+    <mc:Fallback xmlns="">
+      <p:transition spd="med">
+        <p:fade/>
+      </p:transition>
+    </mc:Fallback>
+  </mc:AlternateContent>
+</p:sld>
+</file>
+
+<file path=ppt/slides/slide6.xml><?xml version="1.0" encoding="utf-8"?>
+<p:sld xmlns:a="http://schemas.openxmlformats.org/drawingml/2006/main" xmlns:r="http://schemas.openxmlformats.org/officeDocument/2006/relationships" xmlns:p="http://schemas.openxmlformats.org/presentationml/2006/main">
+  <p:cSld>
+    <p:spTree>
+      <p:nvGrpSpPr>
+        <p:cNvPr id="1" name=""/>
+        <p:cNvGrpSpPr/>
+        <p:nvPr/>
+      </p:nvGrpSpPr>
+      <p:grpSpPr>
+        <a:xfrm>
+          <a:off x="0" y="0"/>
+          <a:ext cx="0" cy="0"/>
+          <a:chOff x="0" y="0"/>
+          <a:chExt cx="0" cy="0"/>
+        </a:xfrm>
+      </p:grpSpPr>
+      <p:sp>
+        <p:nvSpPr>
+          <p:cNvPr id="2" name="Title 1"/>
+          <p:cNvSpPr>
+            <a:spLocks noGrp="1"/>
+          </p:cNvSpPr>
+          <p:nvPr>
+            <p:ph type="title"/>
+          </p:nvPr>
+        </p:nvSpPr>
+        <p:spPr/>
+        <p:txBody>
+          <a:bodyPr/>
+          <a:lstStyle/>
+          <a:p>
+            <a:r>
+              <a:rPr lang="en-US" dirty="0" smtClean="0"/>
+              <a:t>Logical Operators: NOT</a:t>
+            </a:r>
+            <a:endParaRPr lang="en-US" dirty="0"/>
+          </a:p>
+        </p:txBody>
+      </p:sp>
+      <p:sp>
+        <p:nvSpPr>
+          <p:cNvPr id="3" name="Content Placeholder 2"/>
+          <p:cNvSpPr>
+            <a:spLocks noGrp="1"/>
+          </p:cNvSpPr>
+          <p:nvPr>
+            <p:ph idx="1"/>
+          </p:nvPr>
+        </p:nvSpPr>
+        <p:spPr>
+          <a:xfrm>
+            <a:off x="1522413" y="1904999"/>
+            <a:ext cx="9134391" cy="4724401"/>
+          </a:xfrm>
+        </p:spPr>
+        <p:txBody>
+          <a:bodyPr>
+            <a:normAutofit/>
+          </a:bodyPr>
+          <a:lstStyle/>
+          <a:p>
+            <a:r>
+              <a:rPr lang="en-US" dirty="0" smtClean="0"/>
+              <a:t>Performs a bit-wise NOT on an operand</a:t>
+            </a:r>
+          </a:p>
+          <a:p>
+            <a:pPr lvl="1"/>
+            <a:r>
+              <a:rPr lang="en-US" dirty="0" err="1" smtClean="0"/>
+              <a:t>reg</a:t>
+            </a:r>
+            <a:endParaRPr lang="en-US" dirty="0" smtClean="0"/>
+          </a:p>
+          <a:p>
+            <a:pPr lvl="1"/>
+            <a:r>
+              <a:rPr lang="en-US" dirty="0" smtClean="0"/>
+              <a:t>mem</a:t>
+            </a:r>
+          </a:p>
+          <a:p>
+            <a:pPr marL="231775" lvl="1" indent="0">
+              <a:buNone/>
+            </a:pPr>
+            <a:endParaRPr lang="en-US" dirty="0" smtClean="0"/>
+          </a:p>
+          <a:p>
+            <a:pPr marL="231775" lvl="1" indent="0">
+              <a:buNone/>
+            </a:pPr>
+            <a:r>
+              <a:rPr lang="en-US" dirty="0" smtClean="0"/>
+              <a:t>Essentially toggles each bit in an operand</a:t>
+            </a:r>
+          </a:p>
+        </p:txBody>
+      </p:sp>
+    </p:spTree>
+    <p:extLst>
+      <p:ext uri="{BB962C8B-B14F-4D97-AF65-F5344CB8AC3E}">
+        <p14:creationId xmlns:p14="http://schemas.microsoft.com/office/powerpoint/2010/main" val="2902579041"/>
+      </p:ext>
+    </p:extLst>
+  </p:cSld>
+  <p:clrMapOvr>
+    <a:masterClrMapping/>
+  </p:clrMapOvr>
+  <mc:AlternateContent xmlns:mc="http://schemas.openxmlformats.org/markup-compatibility/2006" xmlns:p14="http://schemas.microsoft.com/office/powerpoint/2010/main">
+    <mc:Choice Requires="p14">
+      <p:transition spd="med" p14:dur="700">
+        <p:fade/>
+      </p:transition>
+    </mc:Choice>
+    <mc:Fallback xmlns="">
+      <p:transition spd="med">
+        <p:fade/>
+      </p:transition>
+    </mc:Fallback>
+  </mc:AlternateContent>
+</p:sld>
+</file>
+
+<file path=ppt/slides/slide7.xml><?xml version="1.0" encoding="utf-8"?>
+<p:sld xmlns:a="http://schemas.openxmlformats.org/drawingml/2006/main" xmlns:r="http://schemas.openxmlformats.org/officeDocument/2006/relationships" xmlns:p="http://schemas.openxmlformats.org/presentationml/2006/main">
+  <p:cSld>
+    <p:spTree>
+      <p:nvGrpSpPr>
+        <p:cNvPr id="1" name=""/>
+        <p:cNvGrpSpPr/>
+        <p:nvPr/>
+      </p:nvGrpSpPr>
+      <p:grpSpPr>
+        <a:xfrm>
+          <a:off x="0" y="0"/>
+          <a:ext cx="0" cy="0"/>
+          <a:chOff x="0" y="0"/>
+          <a:chExt cx="0" cy="0"/>
+        </a:xfrm>
+      </p:grpSpPr>
+      <p:sp>
+        <p:nvSpPr>
+          <p:cNvPr id="2" name="Title 1"/>
+          <p:cNvSpPr>
+            <a:spLocks noGrp="1"/>
+          </p:cNvSpPr>
+          <p:nvPr>
+            <p:ph type="title"/>
+          </p:nvPr>
+        </p:nvSpPr>
+        <p:spPr/>
+        <p:txBody>
+          <a:bodyPr/>
+          <a:lstStyle/>
+          <a:p>
+            <a:r>
+              <a:rPr lang="en-US" dirty="0" smtClean="0"/>
+              <a:t>Conditional Branching</a:t>
+            </a:r>
+            <a:endParaRPr lang="en-US" dirty="0"/>
+          </a:p>
+        </p:txBody>
+      </p:sp>
+      <p:sp>
+        <p:nvSpPr>
+          <p:cNvPr id="3" name="Content Placeholder 2"/>
+          <p:cNvSpPr>
+            <a:spLocks noGrp="1"/>
+          </p:cNvSpPr>
+          <p:nvPr>
+            <p:ph idx="1"/>
+          </p:nvPr>
+        </p:nvSpPr>
+        <p:spPr/>
+        <p:txBody>
+          <a:bodyPr/>
+          <a:lstStyle/>
+          <a:p>
+            <a:r>
+              <a:rPr lang="en-US" dirty="0" smtClean="0"/>
+              <a:t>CMP</a:t>
+            </a:r>
+          </a:p>
+          <a:p>
+            <a:pPr lvl="1"/>
+            <a:r>
+              <a:rPr lang="en-US" dirty="0" smtClean="0"/>
+              <a:t>Implied subtraction between two operands</a:t>
+            </a:r>
+          </a:p>
+          <a:p>
+            <a:pPr lvl="1"/>
+            <a:r>
+              <a:rPr lang="en-US" dirty="0" smtClean="0"/>
+              <a:t>Results are discovered by checking various flag registers</a:t>
+            </a:r>
+          </a:p>
+          <a:p>
+            <a:r>
+              <a:rPr lang="en-US" dirty="0" smtClean="0"/>
+              <a:t>IF statements</a:t>
+            </a:r>
+          </a:p>
+          <a:p>
+            <a:pPr lvl="1"/>
+            <a:r>
+              <a:rPr lang="en-US" dirty="0" smtClean="0"/>
+              <a:t>We now have the basic tools we need to implement conditional branching (if statements)</a:t>
+            </a:r>
+          </a:p>
+          <a:p>
+            <a:pPr lvl="1"/>
+            <a:r>
+              <a:rPr lang="en-US" dirty="0" smtClean="0"/>
+              <a:t>What are they?</a:t>
+            </a:r>
+            <a:endParaRPr lang="en-US" dirty="0"/>
+          </a:p>
+        </p:txBody>
+      </p:sp>
+    </p:spTree>
+    <p:extLst>
+      <p:ext uri="{BB962C8B-B14F-4D97-AF65-F5344CB8AC3E}">
+        <p14:creationId xmlns:p14="http://schemas.microsoft.com/office/powerpoint/2010/main" val="1356968771"/>
+      </p:ext>
+    </p:extLst>
+  </p:cSld>
+  <p:clrMapOvr>
+    <a:masterClrMapping/>
+  </p:clrMapOvr>
+  <mc:AlternateContent xmlns:mc="http://schemas.openxmlformats.org/markup-compatibility/2006" xmlns:p14="http://schemas.microsoft.com/office/powerpoint/2010/main">
+    <mc:Choice Requires="p14">
+      <p:transition spd="med" p14:dur="700">
+        <p:fade/>
+      </p:transition>
+    </mc:Choice>
+    <mc:Fallback xmlns="">
+      <p:transition spd="med">
+        <p:fade/>
+      </p:transition>
+    </mc:Fallback>
+  </mc:AlternateContent>
+</p:sld>
+</file>
+
+<file path=ppt/slides/slide8.xml><?xml version="1.0" encoding="utf-8"?>
+<p:sld xmlns:a="http://schemas.openxmlformats.org/drawingml/2006/main" xmlns:r="http://schemas.openxmlformats.org/officeDocument/2006/relationships" xmlns:p="http://schemas.openxmlformats.org/presentationml/2006/main">
+  <p:cSld>
+    <p:spTree>
+      <p:nvGrpSpPr>
+        <p:cNvPr id="1" name=""/>
+        <p:cNvGrpSpPr/>
+        <p:nvPr/>
+      </p:nvGrpSpPr>
+      <p:grpSpPr>
+        <a:xfrm>
+          <a:off x="0" y="0"/>
+          <a:ext cx="0" cy="0"/>
+          <a:chOff x="0" y="0"/>
+          <a:chExt cx="0" cy="0"/>
+        </a:xfrm>
+      </p:grpSpPr>
+      <p:sp>
+        <p:nvSpPr>
+          <p:cNvPr id="2" name="Title 1"/>
+          <p:cNvSpPr>
+            <a:spLocks noGrp="1"/>
+          </p:cNvSpPr>
+          <p:nvPr>
+            <p:ph type="title"/>
+          </p:nvPr>
+        </p:nvSpPr>
+        <p:spPr/>
+        <p:txBody>
+          <a:bodyPr/>
+          <a:lstStyle/>
+          <a:p>
+            <a:r>
+              <a:rPr lang="en-US" dirty="0" smtClean="0"/>
+              <a:t>Conditional Branching</a:t>
+            </a:r>
+            <a:endParaRPr lang="en-US" dirty="0"/>
+          </a:p>
+        </p:txBody>
+      </p:sp>
+      <p:sp>
+        <p:nvSpPr>
+          <p:cNvPr id="3" name="Content Placeholder 2"/>
+          <p:cNvSpPr>
+            <a:spLocks noGrp="1"/>
+          </p:cNvSpPr>
+          <p:nvPr>
+            <p:ph idx="1"/>
+          </p:nvPr>
+        </p:nvSpPr>
+        <p:spPr/>
+        <p:txBody>
+          <a:bodyPr/>
+          <a:lstStyle/>
+          <a:p>
+            <a:r>
+              <a:rPr lang="en-US" dirty="0" smtClean="0"/>
+              <a:t>JCOND</a:t>
+            </a:r>
+          </a:p>
+          <a:p>
+            <a:pPr lvl="1"/>
+            <a:r>
+              <a:rPr lang="en-US" dirty="0" smtClean="0"/>
+              <a:t>Conditional jump</a:t>
+            </a:r>
+          </a:p>
+          <a:p>
+            <a:pPr lvl="1"/>
+            <a:r>
+              <a:rPr lang="en-US" dirty="0" smtClean="0"/>
+              <a:t>Jumps to a location if certain status flag conditions are true</a:t>
+            </a:r>
+          </a:p>
+          <a:p>
+            <a:pPr marL="231775" lvl="1" indent="0">
+              <a:buNone/>
+            </a:pPr>
+            <a:endParaRPr lang="en-US" dirty="0" smtClean="0"/>
+          </a:p>
+        </p:txBody>
+      </p:sp>
+      <p:pic>
+        <p:nvPicPr>
+          <p:cNvPr id="4" name="Picture 3"/>
+          <p:cNvPicPr>
+            <a:picLocks noChangeAspect="1"/>
+          </p:cNvPicPr>
+          <p:nvPr/>
+        </p:nvPicPr>
+        <p:blipFill>
+          <a:blip r:embed="rId2"/>
+          <a:stretch>
+            <a:fillRect/>
+          </a:stretch>
+        </p:blipFill>
+        <p:spPr>
+          <a:xfrm>
+            <a:off x="2055812" y="3200400"/>
+            <a:ext cx="5467350" cy="3419475"/>
+          </a:xfrm>
+          <a:prstGeom prst="rect">
+            <a:avLst/>
+          </a:prstGeom>
+        </p:spPr>
+      </p:pic>
+    </p:spTree>
+    <p:extLst>
+      <p:ext uri="{BB962C8B-B14F-4D97-AF65-F5344CB8AC3E}">
+        <p14:creationId xmlns:p14="http://schemas.microsoft.com/office/powerpoint/2010/main" val="3734358883"/>
+      </p:ext>
+    </p:extLst>
+  </p:cSld>
+  <p:clrMapOvr>
+    <a:masterClrMapping/>
+  </p:clrMapOvr>
+  <mc:AlternateContent xmlns:mc="http://schemas.openxmlformats.org/markup-compatibility/2006" xmlns:p14="http://schemas.microsoft.com/office/powerpoint/2010/main">
+    <mc:Choice Requires="p14">
+      <p:transition spd="med" p14:dur="700">
+        <p:fade/>
+      </p:transition>
+    </mc:Choice>
+    <mc:Fallback xmlns="">
+      <p:transition spd="med">
+        <p:fade/>
+      </p:transition>
+    </mc:Fallback>
+  </mc:AlternateContent>
+</p:sld>
+</file>
+
+<file path=ppt/slides/slide9.xml><?xml version="1.0" encoding="utf-8"?>
+<p:sld xmlns:a="http://schemas.openxmlformats.org/drawingml/2006/main" xmlns:r="http://schemas.openxmlformats.org/officeDocument/2006/relationships" xmlns:p="http://schemas.openxmlformats.org/presentationml/2006/main">
+  <p:cSld>
+    <p:spTree>
+      <p:nvGrpSpPr>
+        <p:cNvPr id="1" name=""/>
+        <p:cNvGrpSpPr/>
+        <p:nvPr/>
+      </p:nvGrpSpPr>
+      <p:grpSpPr>
+        <a:xfrm>
+          <a:off x="0" y="0"/>
+          <a:ext cx="0" cy="0"/>
+          <a:chOff x="0" y="0"/>
+          <a:chExt cx="0" cy="0"/>
+        </a:xfrm>
+      </p:grpSpPr>
+      <p:sp>
+        <p:nvSpPr>
+          <p:cNvPr id="2" name="Title 1"/>
+          <p:cNvSpPr>
+            <a:spLocks noGrp="1"/>
+          </p:cNvSpPr>
+          <p:nvPr>
+            <p:ph type="title"/>
+          </p:nvPr>
+        </p:nvSpPr>
+        <p:spPr/>
+        <p:txBody>
+          <a:bodyPr/>
+          <a:lstStyle/>
+          <a:p>
+            <a:r>
+              <a:rPr lang="en-US" dirty="0" smtClean="0"/>
+              <a:t>Conditional Branching</a:t>
+            </a:r>
+            <a:endParaRPr lang="en-US" dirty="0"/>
+          </a:p>
+        </p:txBody>
+      </p:sp>
+      <p:sp>
+        <p:nvSpPr>
+          <p:cNvPr id="3" name="Content Placeholder 2"/>
+          <p:cNvSpPr>
+            <a:spLocks noGrp="1"/>
+          </p:cNvSpPr>
+          <p:nvPr>
+            <p:ph idx="1"/>
+          </p:nvPr>
+        </p:nvSpPr>
+        <p:spPr/>
+        <p:txBody>
+          <a:bodyPr/>
+          <a:lstStyle/>
+          <a:p>
+            <a:r>
+              <a:rPr lang="en-US" dirty="0" smtClean="0"/>
+              <a:t>Equality checks</a:t>
+            </a:r>
+          </a:p>
+          <a:p>
+            <a:pPr marL="231775" lvl="1" indent="0">
+              <a:buNone/>
+            </a:pPr>
+            <a:endParaRPr lang="en-US" dirty="0" smtClean="0"/>
+          </a:p>
+        </p:txBody>
+      </p:sp>
+      <p:pic>
+        <p:nvPicPr>
+          <p:cNvPr id="5" name="Picture 4"/>
+          <p:cNvPicPr>
+            <a:picLocks noChangeAspect="1"/>
+          </p:cNvPicPr>
+          <p:nvPr/>
+        </p:nvPicPr>
+        <p:blipFill>
+          <a:blip r:embed="rId2"/>
+          <a:stretch>
+            <a:fillRect/>
+          </a:stretch>
+        </p:blipFill>
+        <p:spPr>
+          <a:xfrm>
+            <a:off x="1674812" y="2285999"/>
+            <a:ext cx="8148637" cy="4419601"/>
+          </a:xfrm>
+          <a:prstGeom prst="rect">
+            <a:avLst/>
+          </a:prstGeom>
+        </p:spPr>
+      </p:pic>
+    </p:spTree>
+    <p:extLst>
+      <p:ext uri="{BB962C8B-B14F-4D97-AF65-F5344CB8AC3E}">
+        <p14:creationId xmlns:p14="http://schemas.microsoft.com/office/powerpoint/2010/main" val="1763785748"/>
       </p:ext>
     </p:extLst>
   </p:cSld>

</xml_diff>